<commit_message>
Added CameraMovement and ClickCount back, deteled and delete player name once entred
</commit_message>
<xml_diff>
--- a/Pirate game.pptx
+++ b/Pirate game.pptx
@@ -16,11 +16,12 @@
     <p:sldId id="265" r:id="rId10"/>
     <p:sldId id="267" r:id="rId11"/>
     <p:sldId id="268" r:id="rId12"/>
-    <p:sldId id="269" r:id="rId13"/>
-    <p:sldId id="270" r:id="rId14"/>
-    <p:sldId id="271" r:id="rId15"/>
-    <p:sldId id="264" r:id="rId16"/>
-    <p:sldId id="258" r:id="rId17"/>
+    <p:sldId id="272" r:id="rId13"/>
+    <p:sldId id="269" r:id="rId14"/>
+    <p:sldId id="270" r:id="rId15"/>
+    <p:sldId id="271" r:id="rId16"/>
+    <p:sldId id="264" r:id="rId17"/>
+    <p:sldId id="258" r:id="rId18"/>
   </p:sldIdLst>
   <p:sldSz cx="12192000" cy="6858000"/>
   <p:notesSz cx="6858000" cy="9144000"/>
@@ -276,7 +277,7 @@
           <a:p>
             <a:fld id="{3F681959-2E2B-400E-BB76-F5344F5A96D7}" type="datetimeFigureOut">
               <a:rPr lang="en-GB" smtClean="0"/>
-              <a:t>28/11/2023</a:t>
+              <a:t>06/12/2023</a:t>
             </a:fld>
             <a:endParaRPr lang="en-GB"/>
           </a:p>
@@ -476,7 +477,7 @@
           <a:p>
             <a:fld id="{3F681959-2E2B-400E-BB76-F5344F5A96D7}" type="datetimeFigureOut">
               <a:rPr lang="en-GB" smtClean="0"/>
-              <a:t>28/11/2023</a:t>
+              <a:t>06/12/2023</a:t>
             </a:fld>
             <a:endParaRPr lang="en-GB"/>
           </a:p>
@@ -686,7 +687,7 @@
           <a:p>
             <a:fld id="{3F681959-2E2B-400E-BB76-F5344F5A96D7}" type="datetimeFigureOut">
               <a:rPr lang="en-GB" smtClean="0"/>
-              <a:t>28/11/2023</a:t>
+              <a:t>06/12/2023</a:t>
             </a:fld>
             <a:endParaRPr lang="en-GB"/>
           </a:p>
@@ -886,7 +887,7 @@
           <a:p>
             <a:fld id="{3F681959-2E2B-400E-BB76-F5344F5A96D7}" type="datetimeFigureOut">
               <a:rPr lang="en-GB" smtClean="0"/>
-              <a:t>28/11/2023</a:t>
+              <a:t>06/12/2023</a:t>
             </a:fld>
             <a:endParaRPr lang="en-GB"/>
           </a:p>
@@ -1162,7 +1163,7 @@
           <a:p>
             <a:fld id="{3F681959-2E2B-400E-BB76-F5344F5A96D7}" type="datetimeFigureOut">
               <a:rPr lang="en-GB" smtClean="0"/>
-              <a:t>28/11/2023</a:t>
+              <a:t>06/12/2023</a:t>
             </a:fld>
             <a:endParaRPr lang="en-GB"/>
           </a:p>
@@ -1430,7 +1431,7 @@
           <a:p>
             <a:fld id="{3F681959-2E2B-400E-BB76-F5344F5A96D7}" type="datetimeFigureOut">
               <a:rPr lang="en-GB" smtClean="0"/>
-              <a:t>28/11/2023</a:t>
+              <a:t>06/12/2023</a:t>
             </a:fld>
             <a:endParaRPr lang="en-GB"/>
           </a:p>
@@ -1845,7 +1846,7 @@
           <a:p>
             <a:fld id="{3F681959-2E2B-400E-BB76-F5344F5A96D7}" type="datetimeFigureOut">
               <a:rPr lang="en-GB" smtClean="0"/>
-              <a:t>28/11/2023</a:t>
+              <a:t>06/12/2023</a:t>
             </a:fld>
             <a:endParaRPr lang="en-GB"/>
           </a:p>
@@ -1987,7 +1988,7 @@
           <a:p>
             <a:fld id="{3F681959-2E2B-400E-BB76-F5344F5A96D7}" type="datetimeFigureOut">
               <a:rPr lang="en-GB" smtClean="0"/>
-              <a:t>28/11/2023</a:t>
+              <a:t>06/12/2023</a:t>
             </a:fld>
             <a:endParaRPr lang="en-GB"/>
           </a:p>
@@ -2100,7 +2101,7 @@
           <a:p>
             <a:fld id="{3F681959-2E2B-400E-BB76-F5344F5A96D7}" type="datetimeFigureOut">
               <a:rPr lang="en-GB" smtClean="0"/>
-              <a:t>28/11/2023</a:t>
+              <a:t>06/12/2023</a:t>
             </a:fld>
             <a:endParaRPr lang="en-GB"/>
           </a:p>
@@ -2413,7 +2414,7 @@
           <a:p>
             <a:fld id="{3F681959-2E2B-400E-BB76-F5344F5A96D7}" type="datetimeFigureOut">
               <a:rPr lang="en-GB" smtClean="0"/>
-              <a:t>28/11/2023</a:t>
+              <a:t>06/12/2023</a:t>
             </a:fld>
             <a:endParaRPr lang="en-GB"/>
           </a:p>
@@ -2702,7 +2703,7 @@
           <a:p>
             <a:fld id="{3F681959-2E2B-400E-BB76-F5344F5A96D7}" type="datetimeFigureOut">
               <a:rPr lang="en-GB" smtClean="0"/>
-              <a:t>28/11/2023</a:t>
+              <a:t>06/12/2023</a:t>
             </a:fld>
             <a:endParaRPr lang="en-GB"/>
           </a:p>
@@ -2945,7 +2946,7 @@
           <a:p>
             <a:fld id="{3F681959-2E2B-400E-BB76-F5344F5A96D7}" type="datetimeFigureOut">
               <a:rPr lang="en-GB" smtClean="0"/>
-              <a:t>28/11/2023</a:t>
+              <a:t>06/12/2023</a:t>
             </a:fld>
             <a:endParaRPr lang="en-GB"/>
           </a:p>
@@ -3902,7 +3903,7 @@
           <p:cNvPr id="2" name="Title 1">
             <a:extLst>
               <a:ext uri="{FF2B5EF4-FFF2-40B4-BE49-F238E27FC236}">
-                <a16:creationId xmlns:a16="http://schemas.microsoft.com/office/drawing/2014/main" id="{B75902BA-264A-4E88-665E-5F42A4DEBE4B}"/>
+                <a16:creationId xmlns:a16="http://schemas.microsoft.com/office/drawing/2014/main" id="{43E79902-6EB7-EEC1-EEE6-58211CBDC05B}"/>
               </a:ext>
             </a:extLst>
           </p:cNvPr>
@@ -3920,7 +3921,7 @@
           <a:p>
             <a:r>
               <a:rPr lang="en-GB" dirty="0"/>
-              <a:t>Swipe the Pirates</a:t>
+              <a:t>Rally the crew</a:t>
             </a:r>
           </a:p>
         </p:txBody>
@@ -3930,7 +3931,7 @@
           <p:cNvPr id="3" name="Content Placeholder 2">
             <a:extLst>
               <a:ext uri="{FF2B5EF4-FFF2-40B4-BE49-F238E27FC236}">
-                <a16:creationId xmlns:a16="http://schemas.microsoft.com/office/drawing/2014/main" id="{EA2B9D23-D475-F5E4-C773-1219061F06C8}"/>
+                <a16:creationId xmlns:a16="http://schemas.microsoft.com/office/drawing/2014/main" id="{9889EDF4-A258-5F5C-C19A-CB760ADE6663}"/>
               </a:ext>
             </a:extLst>
           </p:cNvPr>
@@ -3948,31 +3949,39 @@
           <a:p>
             <a:r>
               <a:rPr lang="en-GB" dirty="0"/>
-              <a:t>Start with no pirates on scene, pirates infinitely spawn from the top of the screen.</a:t>
-            </a:r>
-          </a:p>
-          <a:p>
+              <a:t>Start with on crews, and you must shout to bring them in, once you have got 4 of them, they will move on and you will need to rally another 4.</a:t>
+            </a:r>
+          </a:p>
+          <a:p>
+            <a:r>
+              <a:rPr lang="en-GB" dirty="0"/>
+              <a:t>Overall score is number of Crews Rallied * variable.</a:t>
+            </a:r>
+          </a:p>
+          <a:p>
+            <a:r>
+              <a:rPr lang="en-GB" dirty="0"/>
+              <a:t>Progress endless by getting a score equal </a:t>
+            </a:r>
+            <a:r>
+              <a:rPr lang="en-GB"/>
+              <a:t>to 4 </a:t>
+            </a:r>
+            <a:r>
+              <a:rPr lang="en-GB" dirty="0"/>
+              <a:t>crew rallied.</a:t>
+            </a:r>
+          </a:p>
+          <a:p>
+            <a:pPr marL="0" indent="0">
+              <a:buNone/>
+            </a:pPr>
             <a:endParaRPr lang="en-GB" dirty="0"/>
           </a:p>
           <a:p>
             <a:r>
               <a:rPr lang="en-GB" dirty="0"/>
-              <a:t>Overall score is number of pirates swiped * variable.</a:t>
-            </a:r>
-          </a:p>
-          <a:p>
-            <a:r>
-              <a:rPr lang="en-GB" dirty="0"/>
-              <a:t>Progress endless by getting a score equal to 5 pirates swiped.</a:t>
-            </a:r>
-          </a:p>
-          <a:p>
-            <a:endParaRPr lang="en-GB" dirty="0"/>
-          </a:p>
-          <a:p>
-            <a:r>
-              <a:rPr lang="en-GB" dirty="0"/>
-              <a:t>Time reliant features are pirate move speed and spawn time.</a:t>
+              <a:t>Time reliant features are crew rally time.</a:t>
             </a:r>
           </a:p>
         </p:txBody>
@@ -3980,7 +3989,7 @@
     </p:spTree>
     <p:extLst>
       <p:ext uri="{BB962C8B-B14F-4D97-AF65-F5344CB8AC3E}">
-        <p14:creationId xmlns:p14="http://schemas.microsoft.com/office/powerpoint/2010/main" val="2501840794"/>
+        <p14:creationId xmlns:p14="http://schemas.microsoft.com/office/powerpoint/2010/main" val="1370302535"/>
       </p:ext>
     </p:extLst>
   </p:cSld>
@@ -4012,7 +4021,7 @@
           <p:cNvPr id="2" name="Title 1">
             <a:extLst>
               <a:ext uri="{FF2B5EF4-FFF2-40B4-BE49-F238E27FC236}">
-                <a16:creationId xmlns:a16="http://schemas.microsoft.com/office/drawing/2014/main" id="{A9A693B0-704B-1D9C-612E-BC6246A65231}"/>
+                <a16:creationId xmlns:a16="http://schemas.microsoft.com/office/drawing/2014/main" id="{B75902BA-264A-4E88-665E-5F42A4DEBE4B}"/>
               </a:ext>
             </a:extLst>
           </p:cNvPr>
@@ -4030,7 +4039,7 @@
           <a:p>
             <a:r>
               <a:rPr lang="en-GB" dirty="0"/>
-              <a:t>Tap the Trees</a:t>
+              <a:t>Swipe the Pirates</a:t>
             </a:r>
           </a:p>
         </p:txBody>
@@ -4040,7 +4049,7 @@
           <p:cNvPr id="3" name="Content Placeholder 2">
             <a:extLst>
               <a:ext uri="{FF2B5EF4-FFF2-40B4-BE49-F238E27FC236}">
-                <a16:creationId xmlns:a16="http://schemas.microsoft.com/office/drawing/2014/main" id="{8AFDF236-D486-B55C-A6ED-18D441896889}"/>
+                <a16:creationId xmlns:a16="http://schemas.microsoft.com/office/drawing/2014/main" id="{EA2B9D23-D475-F5E4-C773-1219061F06C8}"/>
               </a:ext>
             </a:extLst>
           </p:cNvPr>
@@ -4058,7 +4067,7 @@
           <a:p>
             <a:r>
               <a:rPr lang="en-GB" dirty="0"/>
-              <a:t>Start with 1 tree on scene, once the tree is cut down move to next tree. </a:t>
+              <a:t>Start with no pirates on scene, pirates infinitely spawn from the top of the screen.</a:t>
             </a:r>
           </a:p>
           <a:p>
@@ -4067,13 +4076,13 @@
           <a:p>
             <a:r>
               <a:rPr lang="en-GB" dirty="0"/>
-              <a:t>Overall game is number of taps on trees to cut them * variable.</a:t>
-            </a:r>
-          </a:p>
-          <a:p>
-            <a:r>
-              <a:rPr lang="en-GB" dirty="0"/>
-              <a:t>Progress endless by getting a score equal to 5 cut down trees.</a:t>
+              <a:t>Overall score is number of pirates swiped * variable.</a:t>
+            </a:r>
+          </a:p>
+          <a:p>
+            <a:r>
+              <a:rPr lang="en-GB" dirty="0"/>
+              <a:t>Progress endless by getting a score equal to 5 pirates swiped.</a:t>
             </a:r>
           </a:p>
           <a:p>
@@ -4082,7 +4091,7 @@
           <a:p>
             <a:r>
               <a:rPr lang="en-GB" dirty="0"/>
-              <a:t>Time reliant features are axe reset time and camera move speed.</a:t>
+              <a:t>Time reliant features are pirate move speed and spawn time.</a:t>
             </a:r>
           </a:p>
         </p:txBody>
@@ -4090,7 +4099,7 @@
     </p:spTree>
     <p:extLst>
       <p:ext uri="{BB962C8B-B14F-4D97-AF65-F5344CB8AC3E}">
-        <p14:creationId xmlns:p14="http://schemas.microsoft.com/office/powerpoint/2010/main" val="3378518638"/>
+        <p14:creationId xmlns:p14="http://schemas.microsoft.com/office/powerpoint/2010/main" val="2501840794"/>
       </p:ext>
     </p:extLst>
   </p:cSld>
@@ -4122,6 +4131,116 @@
           <p:cNvPr id="2" name="Title 1">
             <a:extLst>
               <a:ext uri="{FF2B5EF4-FFF2-40B4-BE49-F238E27FC236}">
+                <a16:creationId xmlns:a16="http://schemas.microsoft.com/office/drawing/2014/main" id="{A9A693B0-704B-1D9C-612E-BC6246A65231}"/>
+              </a:ext>
+            </a:extLst>
+          </p:cNvPr>
+          <p:cNvSpPr>
+            <a:spLocks noGrp="1"/>
+          </p:cNvSpPr>
+          <p:nvPr>
+            <p:ph type="title"/>
+          </p:nvPr>
+        </p:nvSpPr>
+        <p:spPr/>
+        <p:txBody>
+          <a:bodyPr/>
+          <a:lstStyle/>
+          <a:p>
+            <a:r>
+              <a:rPr lang="en-GB" dirty="0"/>
+              <a:t>Tap the Trees</a:t>
+            </a:r>
+          </a:p>
+        </p:txBody>
+      </p:sp>
+      <p:sp>
+        <p:nvSpPr>
+          <p:cNvPr id="3" name="Content Placeholder 2">
+            <a:extLst>
+              <a:ext uri="{FF2B5EF4-FFF2-40B4-BE49-F238E27FC236}">
+                <a16:creationId xmlns:a16="http://schemas.microsoft.com/office/drawing/2014/main" id="{8AFDF236-D486-B55C-A6ED-18D441896889}"/>
+              </a:ext>
+            </a:extLst>
+          </p:cNvPr>
+          <p:cNvSpPr>
+            <a:spLocks noGrp="1"/>
+          </p:cNvSpPr>
+          <p:nvPr>
+            <p:ph idx="1"/>
+          </p:nvPr>
+        </p:nvSpPr>
+        <p:spPr/>
+        <p:txBody>
+          <a:bodyPr/>
+          <a:lstStyle/>
+          <a:p>
+            <a:r>
+              <a:rPr lang="en-GB" dirty="0"/>
+              <a:t>Start with 1 tree on scene, once the tree is cut down move to next tree. </a:t>
+            </a:r>
+          </a:p>
+          <a:p>
+            <a:endParaRPr lang="en-GB" dirty="0"/>
+          </a:p>
+          <a:p>
+            <a:r>
+              <a:rPr lang="en-GB" dirty="0"/>
+              <a:t>Overall game is number of taps on trees to cut them * variable.</a:t>
+            </a:r>
+          </a:p>
+          <a:p>
+            <a:r>
+              <a:rPr lang="en-GB" dirty="0"/>
+              <a:t>Progress endless by getting a score equal to 5 cut down trees.</a:t>
+            </a:r>
+          </a:p>
+          <a:p>
+            <a:endParaRPr lang="en-GB" dirty="0"/>
+          </a:p>
+          <a:p>
+            <a:r>
+              <a:rPr lang="en-GB" dirty="0"/>
+              <a:t>Time reliant features are axe reset time and camera move speed.</a:t>
+            </a:r>
+          </a:p>
+        </p:txBody>
+      </p:sp>
+    </p:spTree>
+    <p:extLst>
+      <p:ext uri="{BB962C8B-B14F-4D97-AF65-F5344CB8AC3E}">
+        <p14:creationId xmlns:p14="http://schemas.microsoft.com/office/powerpoint/2010/main" val="3378518638"/>
+      </p:ext>
+    </p:extLst>
+  </p:cSld>
+  <p:clrMapOvr>
+    <a:masterClrMapping/>
+  </p:clrMapOvr>
+</p:sld>
+</file>
+
+<file path=ppt/slides/slide15.xml><?xml version="1.0" encoding="utf-8"?>
+<p:sld xmlns:a="http://schemas.openxmlformats.org/drawingml/2006/main" xmlns:r="http://schemas.openxmlformats.org/officeDocument/2006/relationships" xmlns:p="http://schemas.openxmlformats.org/presentationml/2006/main">
+  <p:cSld>
+    <p:spTree>
+      <p:nvGrpSpPr>
+        <p:cNvPr id="1" name=""/>
+        <p:cNvGrpSpPr/>
+        <p:nvPr/>
+      </p:nvGrpSpPr>
+      <p:grpSpPr>
+        <a:xfrm>
+          <a:off x="0" y="0"/>
+          <a:ext cx="0" cy="0"/>
+          <a:chOff x="0" y="0"/>
+          <a:chExt cx="0" cy="0"/>
+        </a:xfrm>
+      </p:grpSpPr>
+      <p:sp>
+        <p:nvSpPr>
+          <p:cNvPr id="2" name="Title 1">
+            <a:extLst>
+              <a:ext uri="{FF2B5EF4-FFF2-40B4-BE49-F238E27FC236}">
                 <a16:creationId xmlns:a16="http://schemas.microsoft.com/office/drawing/2014/main" id="{90938714-A851-A236-A17D-4690B3D8A010}"/>
               </a:ext>
             </a:extLst>
@@ -4216,7 +4335,7 @@
 </p:sld>
 </file>
 
-<file path=ppt/slides/slide15.xml><?xml version="1.0" encoding="utf-8"?>
+<file path=ppt/slides/slide16.xml><?xml version="1.0" encoding="utf-8"?>
 <p:sld xmlns:a="http://schemas.openxmlformats.org/drawingml/2006/main" xmlns:r="http://schemas.openxmlformats.org/officeDocument/2006/relationships" xmlns:p="http://schemas.openxmlformats.org/presentationml/2006/main">
   <p:cSld>
     <p:spTree>
@@ -4457,7 +4576,7 @@
 </p:sld>
 </file>
 
-<file path=ppt/slides/slide16.xml><?xml version="1.0" encoding="utf-8"?>
+<file path=ppt/slides/slide17.xml><?xml version="1.0" encoding="utf-8"?>
 <p:sld xmlns:a="http://schemas.openxmlformats.org/drawingml/2006/main" xmlns:r="http://schemas.openxmlformats.org/officeDocument/2006/relationships" xmlns:p="http://schemas.openxmlformats.org/presentationml/2006/main">
   <p:cSld>
     <p:spTree>

</xml_diff>

<commit_message>
Add basic game for fighting pirates
</commit_message>
<xml_diff>
--- a/Pirate game.pptx
+++ b/Pirate game.pptx
@@ -16,12 +16,13 @@
     <p:sldId id="265" r:id="rId10"/>
     <p:sldId id="267" r:id="rId11"/>
     <p:sldId id="268" r:id="rId12"/>
-    <p:sldId id="272" r:id="rId13"/>
-    <p:sldId id="269" r:id="rId14"/>
-    <p:sldId id="270" r:id="rId15"/>
-    <p:sldId id="271" r:id="rId16"/>
-    <p:sldId id="264" r:id="rId17"/>
-    <p:sldId id="258" r:id="rId18"/>
+    <p:sldId id="269" r:id="rId13"/>
+    <p:sldId id="272" r:id="rId14"/>
+    <p:sldId id="273" r:id="rId15"/>
+    <p:sldId id="270" r:id="rId16"/>
+    <p:sldId id="271" r:id="rId17"/>
+    <p:sldId id="264" r:id="rId18"/>
+    <p:sldId id="258" r:id="rId19"/>
   </p:sldIdLst>
   <p:sldSz cx="12192000" cy="6858000"/>
   <p:notesSz cx="6858000" cy="9144000"/>
@@ -277,7 +278,7 @@
           <a:p>
             <a:fld id="{3F681959-2E2B-400E-BB76-F5344F5A96D7}" type="datetimeFigureOut">
               <a:rPr lang="en-GB" smtClean="0"/>
-              <a:t>06/12/2023</a:t>
+              <a:t>08/12/2023</a:t>
             </a:fld>
             <a:endParaRPr lang="en-GB"/>
           </a:p>
@@ -477,7 +478,7 @@
           <a:p>
             <a:fld id="{3F681959-2E2B-400E-BB76-F5344F5A96D7}" type="datetimeFigureOut">
               <a:rPr lang="en-GB" smtClean="0"/>
-              <a:t>06/12/2023</a:t>
+              <a:t>08/12/2023</a:t>
             </a:fld>
             <a:endParaRPr lang="en-GB"/>
           </a:p>
@@ -687,7 +688,7 @@
           <a:p>
             <a:fld id="{3F681959-2E2B-400E-BB76-F5344F5A96D7}" type="datetimeFigureOut">
               <a:rPr lang="en-GB" smtClean="0"/>
-              <a:t>06/12/2023</a:t>
+              <a:t>08/12/2023</a:t>
             </a:fld>
             <a:endParaRPr lang="en-GB"/>
           </a:p>
@@ -887,7 +888,7 @@
           <a:p>
             <a:fld id="{3F681959-2E2B-400E-BB76-F5344F5A96D7}" type="datetimeFigureOut">
               <a:rPr lang="en-GB" smtClean="0"/>
-              <a:t>06/12/2023</a:t>
+              <a:t>08/12/2023</a:t>
             </a:fld>
             <a:endParaRPr lang="en-GB"/>
           </a:p>
@@ -1163,7 +1164,7 @@
           <a:p>
             <a:fld id="{3F681959-2E2B-400E-BB76-F5344F5A96D7}" type="datetimeFigureOut">
               <a:rPr lang="en-GB" smtClean="0"/>
-              <a:t>06/12/2023</a:t>
+              <a:t>08/12/2023</a:t>
             </a:fld>
             <a:endParaRPr lang="en-GB"/>
           </a:p>
@@ -1431,7 +1432,7 @@
           <a:p>
             <a:fld id="{3F681959-2E2B-400E-BB76-F5344F5A96D7}" type="datetimeFigureOut">
               <a:rPr lang="en-GB" smtClean="0"/>
-              <a:t>06/12/2023</a:t>
+              <a:t>08/12/2023</a:t>
             </a:fld>
             <a:endParaRPr lang="en-GB"/>
           </a:p>
@@ -1846,7 +1847,7 @@
           <a:p>
             <a:fld id="{3F681959-2E2B-400E-BB76-F5344F5A96D7}" type="datetimeFigureOut">
               <a:rPr lang="en-GB" smtClean="0"/>
-              <a:t>06/12/2023</a:t>
+              <a:t>08/12/2023</a:t>
             </a:fld>
             <a:endParaRPr lang="en-GB"/>
           </a:p>
@@ -1988,7 +1989,7 @@
           <a:p>
             <a:fld id="{3F681959-2E2B-400E-BB76-F5344F5A96D7}" type="datetimeFigureOut">
               <a:rPr lang="en-GB" smtClean="0"/>
-              <a:t>06/12/2023</a:t>
+              <a:t>08/12/2023</a:t>
             </a:fld>
             <a:endParaRPr lang="en-GB"/>
           </a:p>
@@ -2101,7 +2102,7 @@
           <a:p>
             <a:fld id="{3F681959-2E2B-400E-BB76-F5344F5A96D7}" type="datetimeFigureOut">
               <a:rPr lang="en-GB" smtClean="0"/>
-              <a:t>06/12/2023</a:t>
+              <a:t>08/12/2023</a:t>
             </a:fld>
             <a:endParaRPr lang="en-GB"/>
           </a:p>
@@ -2414,7 +2415,7 @@
           <a:p>
             <a:fld id="{3F681959-2E2B-400E-BB76-F5344F5A96D7}" type="datetimeFigureOut">
               <a:rPr lang="en-GB" smtClean="0"/>
-              <a:t>06/12/2023</a:t>
+              <a:t>08/12/2023</a:t>
             </a:fld>
             <a:endParaRPr lang="en-GB"/>
           </a:p>
@@ -2703,7 +2704,7 @@
           <a:p>
             <a:fld id="{3F681959-2E2B-400E-BB76-F5344F5A96D7}" type="datetimeFigureOut">
               <a:rPr lang="en-GB" smtClean="0"/>
-              <a:t>06/12/2023</a:t>
+              <a:t>08/12/2023</a:t>
             </a:fld>
             <a:endParaRPr lang="en-GB"/>
           </a:p>
@@ -2946,7 +2947,7 @@
           <a:p>
             <a:fld id="{3F681959-2E2B-400E-BB76-F5344F5A96D7}" type="datetimeFigureOut">
               <a:rPr lang="en-GB" smtClean="0"/>
-              <a:t>06/12/2023</a:t>
+              <a:t>08/12/2023</a:t>
             </a:fld>
             <a:endParaRPr lang="en-GB"/>
           </a:p>
@@ -3857,7 +3858,7 @@
           <a:p>
             <a:r>
               <a:rPr lang="en-GB" dirty="0"/>
-              <a:t>Time reliant features are shovel reset time and camera move speed.</a:t>
+              <a:t>Time reliant features are shovel reset time.</a:t>
             </a:r>
           </a:p>
           <a:p>
@@ -3903,7 +3904,7 @@
           <p:cNvPr id="2" name="Title 1">
             <a:extLst>
               <a:ext uri="{FF2B5EF4-FFF2-40B4-BE49-F238E27FC236}">
-                <a16:creationId xmlns:a16="http://schemas.microsoft.com/office/drawing/2014/main" id="{43E79902-6EB7-EEC1-EEE6-58211CBDC05B}"/>
+                <a16:creationId xmlns:a16="http://schemas.microsoft.com/office/drawing/2014/main" id="{B75902BA-264A-4E88-665E-5F42A4DEBE4B}"/>
               </a:ext>
             </a:extLst>
           </p:cNvPr>
@@ -3921,7 +3922,7 @@
           <a:p>
             <a:r>
               <a:rPr lang="en-GB" dirty="0"/>
-              <a:t>Rally the crew</a:t>
+              <a:t>Swipe the Pirates</a:t>
             </a:r>
           </a:p>
         </p:txBody>
@@ -3931,7 +3932,7 @@
           <p:cNvPr id="3" name="Content Placeholder 2">
             <a:extLst>
               <a:ext uri="{FF2B5EF4-FFF2-40B4-BE49-F238E27FC236}">
-                <a16:creationId xmlns:a16="http://schemas.microsoft.com/office/drawing/2014/main" id="{9889EDF4-A258-5F5C-C19A-CB760ADE6663}"/>
+                <a16:creationId xmlns:a16="http://schemas.microsoft.com/office/drawing/2014/main" id="{EA2B9D23-D475-F5E4-C773-1219061F06C8}"/>
               </a:ext>
             </a:extLst>
           </p:cNvPr>
@@ -3949,39 +3950,31 @@
           <a:p>
             <a:r>
               <a:rPr lang="en-GB" dirty="0"/>
-              <a:t>Start with on crews, and you must shout to bring them in, once you have got 4 of them, they will move on and you will need to rally another 4.</a:t>
-            </a:r>
-          </a:p>
-          <a:p>
-            <a:r>
-              <a:rPr lang="en-GB" dirty="0"/>
-              <a:t>Overall score is number of Crews Rallied * variable.</a:t>
-            </a:r>
-          </a:p>
-          <a:p>
-            <a:r>
-              <a:rPr lang="en-GB" dirty="0"/>
-              <a:t>Progress endless by getting a score equal </a:t>
-            </a:r>
-            <a:r>
-              <a:rPr lang="en-GB"/>
-              <a:t>to 4 </a:t>
-            </a:r>
-            <a:r>
-              <a:rPr lang="en-GB" dirty="0"/>
-              <a:t>crew rallied.</a:t>
-            </a:r>
-          </a:p>
-          <a:p>
-            <a:pPr marL="0" indent="0">
-              <a:buNone/>
-            </a:pPr>
+              <a:t>Start with no pirates on scene, pirates infinitely spawn from the top of the screen.</a:t>
+            </a:r>
+          </a:p>
+          <a:p>
             <a:endParaRPr lang="en-GB" dirty="0"/>
           </a:p>
           <a:p>
             <a:r>
               <a:rPr lang="en-GB" dirty="0"/>
-              <a:t>Time reliant features are crew rally time.</a:t>
+              <a:t>Overall score is number of pirates swiped * variable.</a:t>
+            </a:r>
+          </a:p>
+          <a:p>
+            <a:r>
+              <a:rPr lang="en-GB" dirty="0"/>
+              <a:t>Progress endless by getting a score equal to 5 pirates swiped.</a:t>
+            </a:r>
+          </a:p>
+          <a:p>
+            <a:endParaRPr lang="en-GB" dirty="0"/>
+          </a:p>
+          <a:p>
+            <a:r>
+              <a:rPr lang="en-GB" dirty="0"/>
+              <a:t>Time reliant features are pirate move speed and spawn time.</a:t>
             </a:r>
           </a:p>
         </p:txBody>
@@ -3989,7 +3982,7 @@
     </p:spTree>
     <p:extLst>
       <p:ext uri="{BB962C8B-B14F-4D97-AF65-F5344CB8AC3E}">
-        <p14:creationId xmlns:p14="http://schemas.microsoft.com/office/powerpoint/2010/main" val="1370302535"/>
+        <p14:creationId xmlns:p14="http://schemas.microsoft.com/office/powerpoint/2010/main" val="2501840794"/>
       </p:ext>
     </p:extLst>
   </p:cSld>
@@ -4021,7 +4014,7 @@
           <p:cNvPr id="2" name="Title 1">
             <a:extLst>
               <a:ext uri="{FF2B5EF4-FFF2-40B4-BE49-F238E27FC236}">
-                <a16:creationId xmlns:a16="http://schemas.microsoft.com/office/drawing/2014/main" id="{B75902BA-264A-4E88-665E-5F42A4DEBE4B}"/>
+                <a16:creationId xmlns:a16="http://schemas.microsoft.com/office/drawing/2014/main" id="{43E79902-6EB7-EEC1-EEE6-58211CBDC05B}"/>
               </a:ext>
             </a:extLst>
           </p:cNvPr>
@@ -4039,7 +4032,7 @@
           <a:p>
             <a:r>
               <a:rPr lang="en-GB" dirty="0"/>
-              <a:t>Swipe the Pirates</a:t>
+              <a:t>Rally the crew</a:t>
             </a:r>
           </a:p>
         </p:txBody>
@@ -4049,7 +4042,7 @@
           <p:cNvPr id="3" name="Content Placeholder 2">
             <a:extLst>
               <a:ext uri="{FF2B5EF4-FFF2-40B4-BE49-F238E27FC236}">
-                <a16:creationId xmlns:a16="http://schemas.microsoft.com/office/drawing/2014/main" id="{EA2B9D23-D475-F5E4-C773-1219061F06C8}"/>
+                <a16:creationId xmlns:a16="http://schemas.microsoft.com/office/drawing/2014/main" id="{9889EDF4-A258-5F5C-C19A-CB760ADE6663}"/>
               </a:ext>
             </a:extLst>
           </p:cNvPr>
@@ -4067,31 +4060,31 @@
           <a:p>
             <a:r>
               <a:rPr lang="en-GB" dirty="0"/>
-              <a:t>Start with no pirates on scene, pirates infinitely spawn from the top of the screen.</a:t>
-            </a:r>
-          </a:p>
-          <a:p>
+              <a:t>Start with on crews, and you must shout to bring them in, once you have got 4 of them, they will move on and you will need to rally another 4.</a:t>
+            </a:r>
+          </a:p>
+          <a:p>
+            <a:r>
+              <a:rPr lang="en-GB" dirty="0"/>
+              <a:t>Overall score is number of Crews Rallied * variable.</a:t>
+            </a:r>
+          </a:p>
+          <a:p>
+            <a:r>
+              <a:rPr lang="en-GB" dirty="0"/>
+              <a:t>Progress endless by getting a score equal to 4 crew rallied.</a:t>
+            </a:r>
+          </a:p>
+          <a:p>
+            <a:pPr marL="0" indent="0">
+              <a:buNone/>
+            </a:pPr>
             <a:endParaRPr lang="en-GB" dirty="0"/>
           </a:p>
           <a:p>
             <a:r>
               <a:rPr lang="en-GB" dirty="0"/>
-              <a:t>Overall score is number of pirates swiped * variable.</a:t>
-            </a:r>
-          </a:p>
-          <a:p>
-            <a:r>
-              <a:rPr lang="en-GB" dirty="0"/>
-              <a:t>Progress endless by getting a score equal to 5 pirates swiped.</a:t>
-            </a:r>
-          </a:p>
-          <a:p>
-            <a:endParaRPr lang="en-GB" dirty="0"/>
-          </a:p>
-          <a:p>
-            <a:r>
-              <a:rPr lang="en-GB" dirty="0"/>
-              <a:t>Time reliant features are pirate move speed and spawn time.</a:t>
+              <a:t>Time reliant features are crew rally time.</a:t>
             </a:r>
           </a:p>
         </p:txBody>
@@ -4099,7 +4092,7 @@
     </p:spTree>
     <p:extLst>
       <p:ext uri="{BB962C8B-B14F-4D97-AF65-F5344CB8AC3E}">
-        <p14:creationId xmlns:p14="http://schemas.microsoft.com/office/powerpoint/2010/main" val="2501840794"/>
+        <p14:creationId xmlns:p14="http://schemas.microsoft.com/office/powerpoint/2010/main" val="1370302535"/>
       </p:ext>
     </p:extLst>
   </p:cSld>
@@ -4131,7 +4124,7 @@
           <p:cNvPr id="2" name="Title 1">
             <a:extLst>
               <a:ext uri="{FF2B5EF4-FFF2-40B4-BE49-F238E27FC236}">
-                <a16:creationId xmlns:a16="http://schemas.microsoft.com/office/drawing/2014/main" id="{A9A693B0-704B-1D9C-612E-BC6246A65231}"/>
+                <a16:creationId xmlns:a16="http://schemas.microsoft.com/office/drawing/2014/main" id="{40F0E72D-7B0A-B174-C0D3-B9C520278C33}"/>
               </a:ext>
             </a:extLst>
           </p:cNvPr>
@@ -4149,7 +4142,7 @@
           <a:p>
             <a:r>
               <a:rPr lang="en-GB" dirty="0"/>
-              <a:t>Tap the Trees</a:t>
+              <a:t>Stab the invaders</a:t>
             </a:r>
           </a:p>
         </p:txBody>
@@ -4159,7 +4152,7 @@
           <p:cNvPr id="3" name="Content Placeholder 2">
             <a:extLst>
               <a:ext uri="{FF2B5EF4-FFF2-40B4-BE49-F238E27FC236}">
-                <a16:creationId xmlns:a16="http://schemas.microsoft.com/office/drawing/2014/main" id="{8AFDF236-D486-B55C-A6ED-18D441896889}"/>
+                <a16:creationId xmlns:a16="http://schemas.microsoft.com/office/drawing/2014/main" id="{81B43663-5C57-D873-2424-A84561AC70CE}"/>
               </a:ext>
             </a:extLst>
           </p:cNvPr>
@@ -4177,7 +4170,7 @@
           <a:p>
             <a:r>
               <a:rPr lang="en-GB" dirty="0"/>
-              <a:t>Start with 1 tree on scene, once the tree is cut down move to next tree. </a:t>
+              <a:t>Start with a pirate in the screen must attack and kill each pirate</a:t>
             </a:r>
           </a:p>
           <a:p>
@@ -4186,13 +4179,13 @@
           <a:p>
             <a:r>
               <a:rPr lang="en-GB" dirty="0"/>
-              <a:t>Overall game is number of taps on trees to cut them * variable.</a:t>
-            </a:r>
-          </a:p>
-          <a:p>
-            <a:r>
-              <a:rPr lang="en-GB" dirty="0"/>
-              <a:t>Progress endless by getting a score equal to 5 cut down trees.</a:t>
+              <a:t>Overall score is total attacks * variable.</a:t>
+            </a:r>
+          </a:p>
+          <a:p>
+            <a:r>
+              <a:rPr lang="en-GB" dirty="0"/>
+              <a:t>Progress endless by getting a score equal to killing two pirates.</a:t>
             </a:r>
           </a:p>
           <a:p>
@@ -4201,15 +4194,18 @@
           <a:p>
             <a:r>
               <a:rPr lang="en-GB" dirty="0"/>
-              <a:t>Time reliant features are axe reset time and camera move speed.</a:t>
-            </a:r>
+              <a:t>Time reliant features are pirates reset time.</a:t>
+            </a:r>
+          </a:p>
+          <a:p>
+            <a:endParaRPr lang="en-GB" dirty="0"/>
           </a:p>
         </p:txBody>
       </p:sp>
     </p:spTree>
     <p:extLst>
       <p:ext uri="{BB962C8B-B14F-4D97-AF65-F5344CB8AC3E}">
-        <p14:creationId xmlns:p14="http://schemas.microsoft.com/office/powerpoint/2010/main" val="3378518638"/>
+        <p14:creationId xmlns:p14="http://schemas.microsoft.com/office/powerpoint/2010/main" val="1957188865"/>
       </p:ext>
     </p:extLst>
   </p:cSld>
@@ -4241,6 +4237,116 @@
           <p:cNvPr id="2" name="Title 1">
             <a:extLst>
               <a:ext uri="{FF2B5EF4-FFF2-40B4-BE49-F238E27FC236}">
+                <a16:creationId xmlns:a16="http://schemas.microsoft.com/office/drawing/2014/main" id="{A9A693B0-704B-1D9C-612E-BC6246A65231}"/>
+              </a:ext>
+            </a:extLst>
+          </p:cNvPr>
+          <p:cNvSpPr>
+            <a:spLocks noGrp="1"/>
+          </p:cNvSpPr>
+          <p:nvPr>
+            <p:ph type="title"/>
+          </p:nvPr>
+        </p:nvSpPr>
+        <p:spPr/>
+        <p:txBody>
+          <a:bodyPr/>
+          <a:lstStyle/>
+          <a:p>
+            <a:r>
+              <a:rPr lang="en-GB" dirty="0"/>
+              <a:t>Tap the Trees</a:t>
+            </a:r>
+          </a:p>
+        </p:txBody>
+      </p:sp>
+      <p:sp>
+        <p:nvSpPr>
+          <p:cNvPr id="3" name="Content Placeholder 2">
+            <a:extLst>
+              <a:ext uri="{FF2B5EF4-FFF2-40B4-BE49-F238E27FC236}">
+                <a16:creationId xmlns:a16="http://schemas.microsoft.com/office/drawing/2014/main" id="{8AFDF236-D486-B55C-A6ED-18D441896889}"/>
+              </a:ext>
+            </a:extLst>
+          </p:cNvPr>
+          <p:cNvSpPr>
+            <a:spLocks noGrp="1"/>
+          </p:cNvSpPr>
+          <p:nvPr>
+            <p:ph idx="1"/>
+          </p:nvPr>
+        </p:nvSpPr>
+        <p:spPr/>
+        <p:txBody>
+          <a:bodyPr/>
+          <a:lstStyle/>
+          <a:p>
+            <a:r>
+              <a:rPr lang="en-GB" dirty="0"/>
+              <a:t>Start with 1 tree on scene, once the tree is cut down move to next tree. </a:t>
+            </a:r>
+          </a:p>
+          <a:p>
+            <a:endParaRPr lang="en-GB" dirty="0"/>
+          </a:p>
+          <a:p>
+            <a:r>
+              <a:rPr lang="en-GB" dirty="0"/>
+              <a:t>Overall game is number of taps on trees to cut them * variable.</a:t>
+            </a:r>
+          </a:p>
+          <a:p>
+            <a:r>
+              <a:rPr lang="en-GB" dirty="0"/>
+              <a:t>Progress endless by getting a score equal to 5 cut down trees.</a:t>
+            </a:r>
+          </a:p>
+          <a:p>
+            <a:endParaRPr lang="en-GB" dirty="0"/>
+          </a:p>
+          <a:p>
+            <a:r>
+              <a:rPr lang="en-GB" dirty="0"/>
+              <a:t>Time reliant features are axe reset time and camera move speed.</a:t>
+            </a:r>
+          </a:p>
+        </p:txBody>
+      </p:sp>
+    </p:spTree>
+    <p:extLst>
+      <p:ext uri="{BB962C8B-B14F-4D97-AF65-F5344CB8AC3E}">
+        <p14:creationId xmlns:p14="http://schemas.microsoft.com/office/powerpoint/2010/main" val="3378518638"/>
+      </p:ext>
+    </p:extLst>
+  </p:cSld>
+  <p:clrMapOvr>
+    <a:masterClrMapping/>
+  </p:clrMapOvr>
+</p:sld>
+</file>
+
+<file path=ppt/slides/slide16.xml><?xml version="1.0" encoding="utf-8"?>
+<p:sld xmlns:a="http://schemas.openxmlformats.org/drawingml/2006/main" xmlns:r="http://schemas.openxmlformats.org/officeDocument/2006/relationships" xmlns:p="http://schemas.openxmlformats.org/presentationml/2006/main">
+  <p:cSld>
+    <p:spTree>
+      <p:nvGrpSpPr>
+        <p:cNvPr id="1" name=""/>
+        <p:cNvGrpSpPr/>
+        <p:nvPr/>
+      </p:nvGrpSpPr>
+      <p:grpSpPr>
+        <a:xfrm>
+          <a:off x="0" y="0"/>
+          <a:ext cx="0" cy="0"/>
+          <a:chOff x="0" y="0"/>
+          <a:chExt cx="0" cy="0"/>
+        </a:xfrm>
+      </p:grpSpPr>
+      <p:sp>
+        <p:nvSpPr>
+          <p:cNvPr id="2" name="Title 1">
+            <a:extLst>
+              <a:ext uri="{FF2B5EF4-FFF2-40B4-BE49-F238E27FC236}">
                 <a16:creationId xmlns:a16="http://schemas.microsoft.com/office/drawing/2014/main" id="{90938714-A851-A236-A17D-4690B3D8A010}"/>
               </a:ext>
             </a:extLst>
@@ -4335,7 +4441,7 @@
 </p:sld>
 </file>
 
-<file path=ppt/slides/slide16.xml><?xml version="1.0" encoding="utf-8"?>
+<file path=ppt/slides/slide17.xml><?xml version="1.0" encoding="utf-8"?>
 <p:sld xmlns:a="http://schemas.openxmlformats.org/drawingml/2006/main" xmlns:r="http://schemas.openxmlformats.org/officeDocument/2006/relationships" xmlns:p="http://schemas.openxmlformats.org/presentationml/2006/main">
   <p:cSld>
     <p:spTree>
@@ -4576,7 +4682,7 @@
 </p:sld>
 </file>
 
-<file path=ppt/slides/slide17.xml><?xml version="1.0" encoding="utf-8"?>
+<file path=ppt/slides/slide18.xml><?xml version="1.0" encoding="utf-8"?>
 <p:sld xmlns:a="http://schemas.openxmlformats.org/drawingml/2006/main" xmlns:r="http://schemas.openxmlformats.org/officeDocument/2006/relationships" xmlns:p="http://schemas.openxmlformats.org/presentationml/2006/main">
   <p:cSld>
     <p:spTree>

</xml_diff>